<commit_message>
Cleaned up lab and field wings
Made better wing source files for future analysis of field and lab, excluded all trace of tpn 7
</commit_message>
<xml_diff>
--- a/Gomez analysis plan/2017_10_15 Brazil Field An darlingi results.pptx
+++ b/Gomez analysis plan/2017_10_15 Brazil Field An darlingi results.pptx
@@ -5,7 +5,7 @@
     <p:sldMasterId id="2147483648" r:id="rId1"/>
   </p:sldMasterIdLst>
   <p:notesMasterIdLst>
-    <p:notesMasterId r:id="rId18"/>
+    <p:notesMasterId r:id="rId20"/>
   </p:notesMasterIdLst>
   <p:sldIdLst>
     <p:sldId id="256" r:id="rId2"/>
@@ -24,6 +24,8 @@
     <p:sldId id="267" r:id="rId15"/>
     <p:sldId id="271" r:id="rId16"/>
     <p:sldId id="270" r:id="rId17"/>
+    <p:sldId id="272" r:id="rId18"/>
+    <p:sldId id="273" r:id="rId19"/>
   </p:sldIdLst>
   <p:sldSz cx="12192000" cy="6858000"/>
   <p:notesSz cx="6858000" cy="9144000"/>
@@ -122,7 +124,16 @@
       </a:defRPr>
     </a:lvl9pPr>
   </p:defaultTextStyle>
+  <p:extLst>
+    <p:ext uri="{EFAFB233-063F-42B5-8137-9DF3F51BA10A}">
+      <p15:sldGuideLst xmlns:p15="http://schemas.microsoft.com/office/powerpoint/2012/main"/>
+    </p:ext>
+  </p:extLst>
 </p:presentation>
+</file>
+
+<file path=ppt/revisionInfo.xml><?xml version="1.0" encoding="utf-8"?>
+<p1510:revInfo xmlns:a="http://schemas.openxmlformats.org/drawingml/2006/main" xmlns:r="http://schemas.openxmlformats.org/officeDocument/2006/relationships" xmlns:p1510="http://schemas.microsoft.com/office/powerpoint/2015/10/main"/>
 </file>
 
 <file path=ppt/notesMasters/notesMaster1.xml><?xml version="1.0" encoding="utf-8"?>
@@ -207,7 +218,7 @@
           <a:p>
             <a:fld id="{5DC03B30-E841-400A-9808-DB43D522D272}" type="datetimeFigureOut">
               <a:rPr lang="en-US" smtClean="0"/>
-              <a:t>10/15/2017</a:t>
+              <a:t>10/16/2017</a:t>
             </a:fld>
             <a:endParaRPr lang="en-US"/>
           </a:p>
@@ -1061,7 +1072,7 @@
           <a:p>
             <a:fld id="{F18E78B6-7540-4731-9669-9F3D2A4C60D5}" type="datetimeFigureOut">
               <a:rPr lang="en-US" smtClean="0"/>
-              <a:t>10/15/2017</a:t>
+              <a:t>10/16/2017</a:t>
             </a:fld>
             <a:endParaRPr lang="en-US"/>
           </a:p>
@@ -1259,7 +1270,7 @@
           <a:p>
             <a:fld id="{F18E78B6-7540-4731-9669-9F3D2A4C60D5}" type="datetimeFigureOut">
               <a:rPr lang="en-US" smtClean="0"/>
-              <a:t>10/15/2017</a:t>
+              <a:t>10/16/2017</a:t>
             </a:fld>
             <a:endParaRPr lang="en-US"/>
           </a:p>
@@ -1467,7 +1478,7 @@
           <a:p>
             <a:fld id="{F18E78B6-7540-4731-9669-9F3D2A4C60D5}" type="datetimeFigureOut">
               <a:rPr lang="en-US" smtClean="0"/>
-              <a:t>10/15/2017</a:t>
+              <a:t>10/16/2017</a:t>
             </a:fld>
             <a:endParaRPr lang="en-US"/>
           </a:p>
@@ -1665,7 +1676,7 @@
           <a:p>
             <a:fld id="{F18E78B6-7540-4731-9669-9F3D2A4C60D5}" type="datetimeFigureOut">
               <a:rPr lang="en-US" smtClean="0"/>
-              <a:t>10/15/2017</a:t>
+              <a:t>10/16/2017</a:t>
             </a:fld>
             <a:endParaRPr lang="en-US"/>
           </a:p>
@@ -1940,7 +1951,7 @@
           <a:p>
             <a:fld id="{F18E78B6-7540-4731-9669-9F3D2A4C60D5}" type="datetimeFigureOut">
               <a:rPr lang="en-US" smtClean="0"/>
-              <a:t>10/15/2017</a:t>
+              <a:t>10/16/2017</a:t>
             </a:fld>
             <a:endParaRPr lang="en-US"/>
           </a:p>
@@ -2205,7 +2216,7 @@
           <a:p>
             <a:fld id="{F18E78B6-7540-4731-9669-9F3D2A4C60D5}" type="datetimeFigureOut">
               <a:rPr lang="en-US" smtClean="0"/>
-              <a:t>10/15/2017</a:t>
+              <a:t>10/16/2017</a:t>
             </a:fld>
             <a:endParaRPr lang="en-US"/>
           </a:p>
@@ -2617,7 +2628,7 @@
           <a:p>
             <a:fld id="{F18E78B6-7540-4731-9669-9F3D2A4C60D5}" type="datetimeFigureOut">
               <a:rPr lang="en-US" smtClean="0"/>
-              <a:t>10/15/2017</a:t>
+              <a:t>10/16/2017</a:t>
             </a:fld>
             <a:endParaRPr lang="en-US"/>
           </a:p>
@@ -2758,7 +2769,7 @@
           <a:p>
             <a:fld id="{F18E78B6-7540-4731-9669-9F3D2A4C60D5}" type="datetimeFigureOut">
               <a:rPr lang="en-US" smtClean="0"/>
-              <a:t>10/15/2017</a:t>
+              <a:t>10/16/2017</a:t>
             </a:fld>
             <a:endParaRPr lang="en-US"/>
           </a:p>
@@ -2871,7 +2882,7 @@
           <a:p>
             <a:fld id="{F18E78B6-7540-4731-9669-9F3D2A4C60D5}" type="datetimeFigureOut">
               <a:rPr lang="en-US" smtClean="0"/>
-              <a:t>10/15/2017</a:t>
+              <a:t>10/16/2017</a:t>
             </a:fld>
             <a:endParaRPr lang="en-US"/>
           </a:p>
@@ -3182,7 +3193,7 @@
           <a:p>
             <a:fld id="{F18E78B6-7540-4731-9669-9F3D2A4C60D5}" type="datetimeFigureOut">
               <a:rPr lang="en-US" smtClean="0"/>
-              <a:t>10/15/2017</a:t>
+              <a:t>10/16/2017</a:t>
             </a:fld>
             <a:endParaRPr lang="en-US"/>
           </a:p>
@@ -3470,7 +3481,7 @@
           <a:p>
             <a:fld id="{F18E78B6-7540-4731-9669-9F3D2A4C60D5}" type="datetimeFigureOut">
               <a:rPr lang="en-US" smtClean="0"/>
-              <a:t>10/15/2017</a:t>
+              <a:t>10/16/2017</a:t>
             </a:fld>
             <a:endParaRPr lang="en-US"/>
           </a:p>
@@ -3711,7 +3722,7 @@
           <a:p>
             <a:fld id="{F18E78B6-7540-4731-9669-9F3D2A4C60D5}" type="datetimeFigureOut">
               <a:rPr lang="en-US" smtClean="0"/>
-              <a:t>10/15/2017</a:t>
+              <a:t>10/16/2017</a:t>
             </a:fld>
             <a:endParaRPr lang="en-US"/>
           </a:p>
@@ -13539,6 +13550,1033 @@
     <p:extLst>
       <p:ext uri="{BB962C8B-B14F-4D97-AF65-F5344CB8AC3E}">
         <p14:creationId xmlns:p14="http://schemas.microsoft.com/office/powerpoint/2010/main" val="2561151825"/>
+      </p:ext>
+    </p:extLst>
+  </p:cSld>
+  <p:clrMapOvr>
+    <a:masterClrMapping/>
+  </p:clrMapOvr>
+</p:sld>
+</file>
+
+<file path=ppt/slides/slide17.xml><?xml version="1.0" encoding="utf-8"?>
+<p:sld xmlns:a="http://schemas.openxmlformats.org/drawingml/2006/main" xmlns:r="http://schemas.openxmlformats.org/officeDocument/2006/relationships" xmlns:p="http://schemas.openxmlformats.org/presentationml/2006/main">
+  <p:cSld>
+    <p:spTree>
+      <p:nvGrpSpPr>
+        <p:cNvPr id="1" name=""/>
+        <p:cNvGrpSpPr/>
+        <p:nvPr/>
+      </p:nvGrpSpPr>
+      <p:grpSpPr>
+        <a:xfrm>
+          <a:off x="0" y="0"/>
+          <a:ext cx="0" cy="0"/>
+          <a:chOff x="0" y="0"/>
+          <a:chExt cx="0" cy="0"/>
+        </a:xfrm>
+      </p:grpSpPr>
+      <p:sp>
+        <p:nvSpPr>
+          <p:cNvPr id="2" name="Title 1">
+            <a:extLst>
+              <a:ext uri="{FF2B5EF4-FFF2-40B4-BE49-F238E27FC236}">
+                <a16:creationId xmlns:a16="http://schemas.microsoft.com/office/drawing/2014/main" id="{CDB221A9-8568-4B31-8AFB-FC704F618214}"/>
+              </a:ext>
+            </a:extLst>
+          </p:cNvPr>
+          <p:cNvSpPr>
+            <a:spLocks noGrp="1"/>
+          </p:cNvSpPr>
+          <p:nvPr>
+            <p:ph type="title"/>
+          </p:nvPr>
+        </p:nvSpPr>
+        <p:spPr/>
+        <p:txBody>
+          <a:bodyPr/>
+          <a:lstStyle/>
+          <a:p>
+            <a:r>
+              <a:rPr lang="en-US" dirty="0"/>
+              <a:t>Factorial </a:t>
+            </a:r>
+            <a:r>
+              <a:rPr lang="en-US" dirty="0" err="1"/>
+              <a:t>Anova</a:t>
+            </a:r>
+            <a:endParaRPr lang="en-US" dirty="0"/>
+          </a:p>
+        </p:txBody>
+      </p:sp>
+      <p:sp>
+        <p:nvSpPr>
+          <p:cNvPr id="3" name="Content Placeholder 2">
+            <a:extLst>
+              <a:ext uri="{FF2B5EF4-FFF2-40B4-BE49-F238E27FC236}">
+                <a16:creationId xmlns:a16="http://schemas.microsoft.com/office/drawing/2014/main" id="{BA5F2E23-BC2B-4344-815C-0E981450B68A}"/>
+              </a:ext>
+            </a:extLst>
+          </p:cNvPr>
+          <p:cNvSpPr>
+            <a:spLocks noGrp="1"/>
+          </p:cNvSpPr>
+          <p:nvPr>
+            <p:ph idx="1"/>
+          </p:nvPr>
+        </p:nvSpPr>
+        <p:spPr>
+          <a:xfrm>
+            <a:off x="838200" y="1825625"/>
+            <a:ext cx="7083669" cy="4351338"/>
+          </a:xfrm>
+        </p:spPr>
+        <p:txBody>
+          <a:bodyPr>
+            <a:normAutofit fontScale="70000" lnSpcReduction="20000"/>
+          </a:bodyPr>
+          <a:lstStyle/>
+          <a:p>
+            <a:pPr marL="0" indent="0">
+              <a:buNone/>
+            </a:pPr>
+            <a:r>
+              <a:rPr lang="en-US" dirty="0"/>
+              <a:t>model = </a:t>
+            </a:r>
+            <a:r>
+              <a:rPr lang="en-US" dirty="0" err="1"/>
+              <a:t>lm</a:t>
+            </a:r>
+            <a:r>
+              <a:rPr lang="en-US" dirty="0"/>
+              <a:t>(CS ~ Biome + Latitude + </a:t>
+            </a:r>
+            <a:r>
+              <a:rPr lang="en-US" dirty="0" err="1"/>
+              <a:t>Biome:Latitude</a:t>
+            </a:r>
+            <a:r>
+              <a:rPr lang="en-US" dirty="0"/>
+              <a:t>, data = </a:t>
+            </a:r>
+            <a:r>
+              <a:rPr lang="en-US" dirty="0" err="1"/>
+              <a:t>fieldw</a:t>
+            </a:r>
+            <a:r>
+              <a:rPr lang="en-US" dirty="0"/>
+              <a:t>)</a:t>
+            </a:r>
+          </a:p>
+          <a:p>
+            <a:pPr marL="0" indent="0">
+              <a:buNone/>
+            </a:pPr>
+            <a:r>
+              <a:rPr lang="en-US" dirty="0"/>
+              <a:t>&gt; </a:t>
+            </a:r>
+            <a:r>
+              <a:rPr lang="en-US" dirty="0" err="1"/>
+              <a:t>Anova</a:t>
+            </a:r>
+            <a:r>
+              <a:rPr lang="en-US" dirty="0"/>
+              <a:t>(model, type="II")</a:t>
+            </a:r>
+          </a:p>
+          <a:p>
+            <a:pPr marL="0" indent="0">
+              <a:buNone/>
+            </a:pPr>
+            <a:r>
+              <a:rPr lang="en-US" dirty="0" err="1"/>
+              <a:t>Anova</a:t>
+            </a:r>
+            <a:r>
+              <a:rPr lang="en-US" dirty="0"/>
+              <a:t> Table (Type II tests)</a:t>
+            </a:r>
+          </a:p>
+          <a:p>
+            <a:pPr marL="0" indent="0">
+              <a:buNone/>
+            </a:pPr>
+            <a:endParaRPr lang="en-US" dirty="0"/>
+          </a:p>
+          <a:p>
+            <a:pPr marL="0" indent="0">
+              <a:buNone/>
+            </a:pPr>
+            <a:r>
+              <a:rPr lang="en-US" dirty="0"/>
+              <a:t>Response: CS</a:t>
+            </a:r>
+          </a:p>
+          <a:p>
+            <a:pPr marL="0" indent="0">
+              <a:buNone/>
+            </a:pPr>
+            <a:r>
+              <a:rPr lang="en-US" dirty="0"/>
+              <a:t>               Sum </a:t>
+            </a:r>
+            <a:r>
+              <a:rPr lang="en-US" dirty="0" err="1"/>
+              <a:t>Sq</a:t>
+            </a:r>
+            <a:r>
+              <a:rPr lang="en-US" dirty="0"/>
+              <a:t>  </a:t>
+            </a:r>
+            <a:r>
+              <a:rPr lang="en-US" dirty="0" err="1"/>
+              <a:t>Df</a:t>
+            </a:r>
+            <a:r>
+              <a:rPr lang="en-US" dirty="0"/>
+              <a:t> F value    </a:t>
+            </a:r>
+            <a:r>
+              <a:rPr lang="en-US" dirty="0" err="1"/>
+              <a:t>Pr</a:t>
+            </a:r>
+            <a:r>
+              <a:rPr lang="en-US" dirty="0"/>
+              <a:t>(&gt;F)    </a:t>
+            </a:r>
+          </a:p>
+          <a:p>
+            <a:pPr marL="0" indent="0">
+              <a:buNone/>
+            </a:pPr>
+            <a:r>
+              <a:rPr lang="en-US" dirty="0">
+                <a:highlight>
+                  <a:srgbClr val="FFFF00"/>
+                </a:highlight>
+              </a:rPr>
+              <a:t>Biome          0.4600   2  8.8746 0.0001925 ***</a:t>
+            </a:r>
+          </a:p>
+          <a:p>
+            <a:pPr marL="0" indent="0">
+              <a:buNone/>
+            </a:pPr>
+            <a:r>
+              <a:rPr lang="en-US" dirty="0"/>
+              <a:t>Latitude       0.0940   1  3.6288 0.0580101 .  </a:t>
+            </a:r>
+          </a:p>
+          <a:p>
+            <a:pPr marL="0" indent="0">
+              <a:buNone/>
+            </a:pPr>
+            <a:r>
+              <a:rPr lang="en-US" dirty="0" err="1"/>
+              <a:t>Biome:Latitude</a:t>
+            </a:r>
+            <a:r>
+              <a:rPr lang="en-US" dirty="0"/>
+              <a:t> 0.0249   1  0.9612 0.3279049    </a:t>
+            </a:r>
+          </a:p>
+          <a:p>
+            <a:pPr marL="0" indent="0">
+              <a:buNone/>
+            </a:pPr>
+            <a:r>
+              <a:rPr lang="en-US" dirty="0"/>
+              <a:t>Residuals      6.0907 235                      </a:t>
+            </a:r>
+          </a:p>
+          <a:p>
+            <a:pPr marL="0" indent="0">
+              <a:buNone/>
+            </a:pPr>
+            <a:r>
+              <a:rPr lang="en-US" dirty="0"/>
+              <a:t>---</a:t>
+            </a:r>
+          </a:p>
+          <a:p>
+            <a:pPr marL="0" indent="0">
+              <a:buNone/>
+            </a:pPr>
+            <a:r>
+              <a:rPr lang="en-US" dirty="0" err="1"/>
+              <a:t>Signif</a:t>
+            </a:r>
+            <a:r>
+              <a:rPr lang="en-US" dirty="0"/>
+              <a:t>. codes:  0 ‘***’ 0.001 ‘**’ 0.01 ‘*’ 0.05 ‘.’ 0.1 ‘ ’ 1</a:t>
+            </a:r>
+          </a:p>
+        </p:txBody>
+      </p:sp>
+    </p:spTree>
+    <p:extLst>
+      <p:ext uri="{BB962C8B-B14F-4D97-AF65-F5344CB8AC3E}">
+        <p14:creationId xmlns:p14="http://schemas.microsoft.com/office/powerpoint/2010/main" val="420752457"/>
+      </p:ext>
+    </p:extLst>
+  </p:cSld>
+  <p:clrMapOvr>
+    <a:masterClrMapping/>
+  </p:clrMapOvr>
+</p:sld>
+</file>
+
+<file path=ppt/slides/slide18.xml><?xml version="1.0" encoding="utf-8"?>
+<p:sld xmlns:a="http://schemas.openxmlformats.org/drawingml/2006/main" xmlns:r="http://schemas.openxmlformats.org/officeDocument/2006/relationships" xmlns:p="http://schemas.openxmlformats.org/presentationml/2006/main">
+  <p:cSld>
+    <p:spTree>
+      <p:nvGrpSpPr>
+        <p:cNvPr id="1" name=""/>
+        <p:cNvGrpSpPr/>
+        <p:nvPr/>
+      </p:nvGrpSpPr>
+      <p:grpSpPr>
+        <a:xfrm>
+          <a:off x="0" y="0"/>
+          <a:ext cx="0" cy="0"/>
+          <a:chOff x="0" y="0"/>
+          <a:chExt cx="0" cy="0"/>
+        </a:xfrm>
+      </p:grpSpPr>
+      <p:sp>
+        <p:nvSpPr>
+          <p:cNvPr id="2" name="Title 1">
+            <a:extLst>
+              <a:ext uri="{FF2B5EF4-FFF2-40B4-BE49-F238E27FC236}">
+                <a16:creationId xmlns:a16="http://schemas.microsoft.com/office/drawing/2014/main" id="{80CB999E-2D33-4BA7-88BD-0E9F1373AF18}"/>
+              </a:ext>
+            </a:extLst>
+          </p:cNvPr>
+          <p:cNvSpPr>
+            <a:spLocks noGrp="1"/>
+          </p:cNvSpPr>
+          <p:nvPr>
+            <p:ph type="title"/>
+          </p:nvPr>
+        </p:nvSpPr>
+        <p:spPr/>
+        <p:txBody>
+          <a:bodyPr/>
+          <a:lstStyle/>
+          <a:p>
+            <a:r>
+              <a:rPr lang="en-US" dirty="0"/>
+              <a:t>MANOVA</a:t>
+            </a:r>
+          </a:p>
+        </p:txBody>
+      </p:sp>
+      <p:sp>
+        <p:nvSpPr>
+          <p:cNvPr id="3" name="Content Placeholder 2">
+            <a:extLst>
+              <a:ext uri="{FF2B5EF4-FFF2-40B4-BE49-F238E27FC236}">
+                <a16:creationId xmlns:a16="http://schemas.microsoft.com/office/drawing/2014/main" id="{CB2003EB-830C-444E-B496-ECBFA8CFE071}"/>
+              </a:ext>
+            </a:extLst>
+          </p:cNvPr>
+          <p:cNvSpPr>
+            <a:spLocks noGrp="1"/>
+          </p:cNvSpPr>
+          <p:nvPr>
+            <p:ph idx="1"/>
+          </p:nvPr>
+        </p:nvSpPr>
+        <p:spPr>
+          <a:xfrm>
+            <a:off x="697522" y="1438764"/>
+            <a:ext cx="4287715" cy="4351338"/>
+          </a:xfrm>
+        </p:spPr>
+        <p:txBody>
+          <a:bodyPr>
+            <a:noAutofit/>
+          </a:bodyPr>
+          <a:lstStyle/>
+          <a:p>
+            <a:pPr marL="0" indent="0">
+              <a:buNone/>
+            </a:pPr>
+            <a:r>
+              <a:rPr lang="en-US" sz="1000" dirty="0" err="1"/>
+              <a:t>fieldres.man</a:t>
+            </a:r>
+            <a:r>
+              <a:rPr lang="en-US" sz="1000" dirty="0"/>
+              <a:t>&lt;-</a:t>
+            </a:r>
+            <a:r>
+              <a:rPr lang="en-US" sz="1000" dirty="0" err="1"/>
+              <a:t>manova</a:t>
+            </a:r>
+            <a:r>
+              <a:rPr lang="en-US" sz="1000" dirty="0"/>
+              <a:t>(</a:t>
+            </a:r>
+            <a:r>
+              <a:rPr lang="en-US" sz="1000" dirty="0" err="1"/>
+              <a:t>cbind</a:t>
+            </a:r>
+            <a:r>
+              <a:rPr lang="en-US" sz="1000" dirty="0"/>
+              <a:t>(Length.mm, CS)~Locality, data=</a:t>
+            </a:r>
+            <a:r>
+              <a:rPr lang="en-US" sz="1000" dirty="0" err="1"/>
+              <a:t>fieldw</a:t>
+            </a:r>
+            <a:r>
+              <a:rPr lang="en-US" sz="1000" dirty="0"/>
+              <a:t>)</a:t>
+            </a:r>
+          </a:p>
+          <a:p>
+            <a:pPr marL="0" indent="0">
+              <a:buNone/>
+            </a:pPr>
+            <a:r>
+              <a:rPr lang="en-US" sz="1000" dirty="0"/>
+              <a:t>&gt; summary(</a:t>
+            </a:r>
+            <a:r>
+              <a:rPr lang="en-US" sz="1000" dirty="0" err="1"/>
+              <a:t>fieldres.man,test</a:t>
+            </a:r>
+            <a:r>
+              <a:rPr lang="en-US" sz="1000" dirty="0"/>
+              <a:t>="Wilks")</a:t>
+            </a:r>
+          </a:p>
+          <a:p>
+            <a:pPr marL="0" indent="0">
+              <a:buNone/>
+            </a:pPr>
+            <a:r>
+              <a:rPr lang="en-US" sz="1000" dirty="0"/>
+              <a:t>           </a:t>
+            </a:r>
+            <a:r>
+              <a:rPr lang="en-US" sz="1000" dirty="0" err="1"/>
+              <a:t>Df</a:t>
+            </a:r>
+            <a:r>
+              <a:rPr lang="en-US" sz="1000" dirty="0"/>
+              <a:t>   Wilks </a:t>
+            </a:r>
+            <a:r>
+              <a:rPr lang="en-US" sz="1000" dirty="0" err="1"/>
+              <a:t>approx</a:t>
+            </a:r>
+            <a:r>
+              <a:rPr lang="en-US" sz="1000" dirty="0"/>
+              <a:t> F </a:t>
+            </a:r>
+            <a:r>
+              <a:rPr lang="en-US" sz="1000" dirty="0" err="1"/>
+              <a:t>num</a:t>
+            </a:r>
+            <a:r>
+              <a:rPr lang="en-US" sz="1000" dirty="0"/>
+              <a:t> </a:t>
+            </a:r>
+            <a:r>
+              <a:rPr lang="en-US" sz="1000" dirty="0" err="1"/>
+              <a:t>Df</a:t>
+            </a:r>
+            <a:r>
+              <a:rPr lang="en-US" sz="1000" dirty="0"/>
+              <a:t> den </a:t>
+            </a:r>
+            <a:r>
+              <a:rPr lang="en-US" sz="1000" dirty="0" err="1"/>
+              <a:t>Df</a:t>
+            </a:r>
+            <a:r>
+              <a:rPr lang="en-US" sz="1000" dirty="0"/>
+              <a:t>    </a:t>
+            </a:r>
+            <a:r>
+              <a:rPr lang="en-US" sz="1000" dirty="0" err="1"/>
+              <a:t>Pr</a:t>
+            </a:r>
+            <a:r>
+              <a:rPr lang="en-US" sz="1000" dirty="0"/>
+              <a:t>(&gt;F)    </a:t>
+            </a:r>
+          </a:p>
+          <a:p>
+            <a:pPr marL="0" indent="0">
+              <a:buNone/>
+            </a:pPr>
+            <a:r>
+              <a:rPr lang="en-US" sz="1000" dirty="0">
+                <a:highlight>
+                  <a:srgbClr val="FFFF00"/>
+                </a:highlight>
+              </a:rPr>
+              <a:t>Locality    6 0.57775   12.204     12    464 &lt; 2.2e-16 ***</a:t>
+            </a:r>
+          </a:p>
+          <a:p>
+            <a:pPr marL="0" indent="0">
+              <a:buNone/>
+            </a:pPr>
+            <a:r>
+              <a:rPr lang="en-US" sz="1000" dirty="0"/>
+              <a:t>Residuals 233                                             </a:t>
+            </a:r>
+          </a:p>
+          <a:p>
+            <a:pPr marL="0" indent="0">
+              <a:buNone/>
+            </a:pPr>
+            <a:r>
+              <a:rPr lang="en-US" sz="1000" dirty="0"/>
+              <a:t>---</a:t>
+            </a:r>
+          </a:p>
+          <a:p>
+            <a:pPr marL="0" indent="0">
+              <a:buNone/>
+            </a:pPr>
+            <a:r>
+              <a:rPr lang="en-US" sz="1000" dirty="0" err="1"/>
+              <a:t>Signif</a:t>
+            </a:r>
+            <a:r>
+              <a:rPr lang="en-US" sz="1000" dirty="0"/>
+              <a:t>. codes:  0 ‘***’ 0.001 ‘**’ 0.01 ‘*’ 0.05 ‘.’ 0.1 ‘ ’ 1</a:t>
+            </a:r>
+          </a:p>
+          <a:p>
+            <a:pPr marL="0" indent="0">
+              <a:buNone/>
+            </a:pPr>
+            <a:r>
+              <a:rPr lang="en-US" sz="1000" dirty="0"/>
+              <a:t>&gt; </a:t>
+            </a:r>
+            <a:r>
+              <a:rPr lang="en-US" sz="1000" dirty="0" err="1"/>
+              <a:t>summary.aov</a:t>
+            </a:r>
+            <a:r>
+              <a:rPr lang="en-US" sz="1000" dirty="0"/>
+              <a:t>(</a:t>
+            </a:r>
+            <a:r>
+              <a:rPr lang="en-US" sz="1000" dirty="0" err="1"/>
+              <a:t>fieldres.man</a:t>
+            </a:r>
+            <a:r>
+              <a:rPr lang="en-US" sz="1000" dirty="0"/>
+              <a:t>)</a:t>
+            </a:r>
+          </a:p>
+          <a:p>
+            <a:pPr marL="0" indent="0">
+              <a:buNone/>
+            </a:pPr>
+            <a:r>
+              <a:rPr lang="en-US" sz="1000" dirty="0"/>
+              <a:t> Response Length.mm :</a:t>
+            </a:r>
+          </a:p>
+          <a:p>
+            <a:pPr marL="0" indent="0">
+              <a:buNone/>
+            </a:pPr>
+            <a:r>
+              <a:rPr lang="en-US" sz="1000" dirty="0"/>
+              <a:t>             </a:t>
+            </a:r>
+            <a:r>
+              <a:rPr lang="en-US" sz="1000" dirty="0" err="1"/>
+              <a:t>Df</a:t>
+            </a:r>
+            <a:r>
+              <a:rPr lang="en-US" sz="1000" dirty="0"/>
+              <a:t> Sum </a:t>
+            </a:r>
+            <a:r>
+              <a:rPr lang="en-US" sz="1000" dirty="0" err="1"/>
+              <a:t>Sq</a:t>
+            </a:r>
+            <a:r>
+              <a:rPr lang="en-US" sz="1000" dirty="0"/>
+              <a:t> Mean </a:t>
+            </a:r>
+            <a:r>
+              <a:rPr lang="en-US" sz="1000" dirty="0" err="1"/>
+              <a:t>Sq</a:t>
+            </a:r>
+            <a:r>
+              <a:rPr lang="en-US" sz="1000" dirty="0"/>
+              <a:t> F value    </a:t>
+            </a:r>
+            <a:r>
+              <a:rPr lang="en-US" sz="1000" dirty="0" err="1"/>
+              <a:t>Pr</a:t>
+            </a:r>
+            <a:r>
+              <a:rPr lang="en-US" sz="1000" dirty="0"/>
+              <a:t>(&gt;F)    </a:t>
+            </a:r>
+          </a:p>
+          <a:p>
+            <a:pPr marL="0" indent="0">
+              <a:buNone/>
+            </a:pPr>
+            <a:r>
+              <a:rPr lang="en-US" sz="1000" dirty="0"/>
+              <a:t>Locality      6 3.2791 0.54652  18.679 &lt; 2.2e-16 ***</a:t>
+            </a:r>
+          </a:p>
+          <a:p>
+            <a:pPr marL="0" indent="0">
+              <a:buNone/>
+            </a:pPr>
+            <a:r>
+              <a:rPr lang="en-US" sz="1000" dirty="0"/>
+              <a:t>Residuals   233 6.8171 0.02926                      </a:t>
+            </a:r>
+          </a:p>
+          <a:p>
+            <a:pPr marL="0" indent="0">
+              <a:buNone/>
+            </a:pPr>
+            <a:r>
+              <a:rPr lang="en-US" sz="1000" dirty="0"/>
+              <a:t>---</a:t>
+            </a:r>
+          </a:p>
+          <a:p>
+            <a:pPr marL="0" indent="0">
+              <a:buNone/>
+            </a:pPr>
+            <a:r>
+              <a:rPr lang="en-US" sz="1000" dirty="0" err="1"/>
+              <a:t>Signif</a:t>
+            </a:r>
+            <a:r>
+              <a:rPr lang="en-US" sz="1000" dirty="0"/>
+              <a:t>. codes:  0 ‘***’ 0.001 ‘**’ 0.01 ‘*’ 0.05 ‘.’ 0.1 ‘ ’ 1</a:t>
+            </a:r>
+          </a:p>
+          <a:p>
+            <a:pPr marL="0" indent="0">
+              <a:buNone/>
+            </a:pPr>
+            <a:r>
+              <a:rPr lang="en-US" sz="1000" dirty="0"/>
+              <a:t> Response CS :</a:t>
+            </a:r>
+          </a:p>
+          <a:p>
+            <a:pPr marL="0" indent="0">
+              <a:buNone/>
+            </a:pPr>
+            <a:r>
+              <a:rPr lang="en-US" sz="1000" dirty="0"/>
+              <a:t>             </a:t>
+            </a:r>
+            <a:r>
+              <a:rPr lang="en-US" sz="1000" dirty="0" err="1"/>
+              <a:t>Df</a:t>
+            </a:r>
+            <a:r>
+              <a:rPr lang="en-US" sz="1000" dirty="0"/>
+              <a:t> Sum </a:t>
+            </a:r>
+            <a:r>
+              <a:rPr lang="en-US" sz="1000" dirty="0" err="1"/>
+              <a:t>Sq</a:t>
+            </a:r>
+            <a:r>
+              <a:rPr lang="en-US" sz="1000" dirty="0"/>
+              <a:t> Mean </a:t>
+            </a:r>
+            <a:r>
+              <a:rPr lang="en-US" sz="1000" dirty="0" err="1"/>
+              <a:t>Sq</a:t>
+            </a:r>
+            <a:r>
+              <a:rPr lang="en-US" sz="1000" dirty="0"/>
+              <a:t> F value    </a:t>
+            </a:r>
+            <a:r>
+              <a:rPr lang="en-US" sz="1000" dirty="0" err="1"/>
+              <a:t>Pr</a:t>
+            </a:r>
+            <a:r>
+              <a:rPr lang="en-US" sz="1000" dirty="0"/>
+              <a:t>(&gt;F)    </a:t>
+            </a:r>
+          </a:p>
+          <a:p>
+            <a:pPr marL="0" indent="0">
+              <a:buNone/>
+            </a:pPr>
+            <a:r>
+              <a:rPr lang="en-US" sz="1000" dirty="0"/>
+              <a:t>Locality      6 3.1201 0.52002  20.465 &lt; 2.2e-16 ***</a:t>
+            </a:r>
+          </a:p>
+          <a:p>
+            <a:pPr marL="0" indent="0">
+              <a:buNone/>
+            </a:pPr>
+            <a:r>
+              <a:rPr lang="en-US" sz="1000" dirty="0"/>
+              <a:t>Residuals   233 5.9207 0.02541                      </a:t>
+            </a:r>
+          </a:p>
+          <a:p>
+            <a:pPr marL="0" indent="0">
+              <a:buNone/>
+            </a:pPr>
+            <a:r>
+              <a:rPr lang="en-US" sz="1000" dirty="0"/>
+              <a:t>---</a:t>
+            </a:r>
+          </a:p>
+          <a:p>
+            <a:pPr marL="0" indent="0">
+              <a:buNone/>
+            </a:pPr>
+            <a:r>
+              <a:rPr lang="en-US" sz="1000" dirty="0" err="1"/>
+              <a:t>Signif</a:t>
+            </a:r>
+            <a:r>
+              <a:rPr lang="en-US" sz="1000" dirty="0"/>
+              <a:t>. codes:  0 ‘***’ 0.001 ‘**’ 0.01 ‘*’ 0.05 ‘.’ 0.1 ‘ ’ 1</a:t>
+            </a:r>
+          </a:p>
+        </p:txBody>
+      </p:sp>
+      <p:sp>
+        <p:nvSpPr>
+          <p:cNvPr id="5" name="Rectangle 4">
+            <a:extLst>
+              <a:ext uri="{FF2B5EF4-FFF2-40B4-BE49-F238E27FC236}">
+                <a16:creationId xmlns:a16="http://schemas.microsoft.com/office/drawing/2014/main" id="{02F624A5-47B0-4CC6-AFD2-3CC8A3A2ED14}"/>
+              </a:ext>
+            </a:extLst>
+          </p:cNvPr>
+          <p:cNvSpPr/>
+          <p:nvPr/>
+        </p:nvSpPr>
+        <p:spPr>
+          <a:xfrm>
+            <a:off x="6025661" y="2078401"/>
+            <a:ext cx="4062046" cy="3323987"/>
+          </a:xfrm>
+          <a:prstGeom prst="rect">
+            <a:avLst/>
+          </a:prstGeom>
+        </p:spPr>
+        <p:txBody>
+          <a:bodyPr wrap="square">
+            <a:spAutoFit/>
+          </a:bodyPr>
+          <a:lstStyle/>
+          <a:p>
+            <a:r>
+              <a:rPr lang="en-US" sz="1000" dirty="0"/>
+              <a:t>fieldres.man1&lt;-</a:t>
+            </a:r>
+            <a:r>
+              <a:rPr lang="en-US" sz="1000" dirty="0" err="1"/>
+              <a:t>manova</a:t>
+            </a:r>
+            <a:r>
+              <a:rPr lang="en-US" sz="1000" dirty="0"/>
+              <a:t>(</a:t>
+            </a:r>
+            <a:r>
+              <a:rPr lang="en-US" sz="1000" dirty="0" err="1"/>
+              <a:t>cbind</a:t>
+            </a:r>
+            <a:r>
+              <a:rPr lang="en-US" sz="1000" dirty="0"/>
+              <a:t>(Length.mm, CS)~Biome, data=</a:t>
+            </a:r>
+            <a:r>
+              <a:rPr lang="en-US" sz="1000" dirty="0" err="1"/>
+              <a:t>fieldw</a:t>
+            </a:r>
+            <a:r>
+              <a:rPr lang="en-US" sz="1000" dirty="0"/>
+              <a:t>)</a:t>
+            </a:r>
+          </a:p>
+          <a:p>
+            <a:r>
+              <a:rPr lang="en-US" sz="1000" dirty="0"/>
+              <a:t>&gt; summary(fieldres.man1,test="Wilks")</a:t>
+            </a:r>
+          </a:p>
+          <a:p>
+            <a:r>
+              <a:rPr lang="en-US" sz="1000" dirty="0"/>
+              <a:t>           </a:t>
+            </a:r>
+            <a:r>
+              <a:rPr lang="en-US" sz="1000" dirty="0" err="1"/>
+              <a:t>Df</a:t>
+            </a:r>
+            <a:r>
+              <a:rPr lang="en-US" sz="1000" dirty="0"/>
+              <a:t>   Wilks </a:t>
+            </a:r>
+            <a:r>
+              <a:rPr lang="en-US" sz="1000" dirty="0" err="1"/>
+              <a:t>approx</a:t>
+            </a:r>
+            <a:r>
+              <a:rPr lang="en-US" sz="1000" dirty="0"/>
+              <a:t> F </a:t>
+            </a:r>
+            <a:r>
+              <a:rPr lang="en-US" sz="1000" dirty="0" err="1"/>
+              <a:t>num</a:t>
+            </a:r>
+            <a:r>
+              <a:rPr lang="en-US" sz="1000" dirty="0"/>
+              <a:t> </a:t>
+            </a:r>
+            <a:r>
+              <a:rPr lang="en-US" sz="1000" dirty="0" err="1"/>
+              <a:t>Df</a:t>
+            </a:r>
+            <a:r>
+              <a:rPr lang="en-US" sz="1000" dirty="0"/>
+              <a:t> den </a:t>
+            </a:r>
+            <a:r>
+              <a:rPr lang="en-US" sz="1000" dirty="0" err="1"/>
+              <a:t>Df</a:t>
+            </a:r>
+            <a:r>
+              <a:rPr lang="en-US" sz="1000" dirty="0"/>
+              <a:t>    </a:t>
+            </a:r>
+            <a:r>
+              <a:rPr lang="en-US" sz="1000" dirty="0" err="1"/>
+              <a:t>Pr</a:t>
+            </a:r>
+            <a:r>
+              <a:rPr lang="en-US" sz="1000" dirty="0"/>
+              <a:t>(&gt;F)    </a:t>
+            </a:r>
+          </a:p>
+          <a:p>
+            <a:r>
+              <a:rPr lang="en-US" sz="1000" dirty="0">
+                <a:highlight>
+                  <a:srgbClr val="FFFF00"/>
+                </a:highlight>
+              </a:rPr>
+              <a:t>Biome       2 0.67752   25.358      4    472 &lt; 2.2e-16 ***</a:t>
+            </a:r>
+          </a:p>
+          <a:p>
+            <a:r>
+              <a:rPr lang="en-US" sz="1000" dirty="0"/>
+              <a:t>Residuals 237                                             </a:t>
+            </a:r>
+          </a:p>
+          <a:p>
+            <a:r>
+              <a:rPr lang="en-US" sz="1000" dirty="0"/>
+              <a:t>---</a:t>
+            </a:r>
+          </a:p>
+          <a:p>
+            <a:r>
+              <a:rPr lang="en-US" sz="1000" dirty="0" err="1"/>
+              <a:t>Signif</a:t>
+            </a:r>
+            <a:r>
+              <a:rPr lang="en-US" sz="1000" dirty="0"/>
+              <a:t>. codes:  0 ‘***’ 0.001 ‘**’ 0.01 ‘*’ 0.05 ‘.’ 0.1 ‘ ’ 1</a:t>
+            </a:r>
+          </a:p>
+          <a:p>
+            <a:r>
+              <a:rPr lang="en-US" sz="1000" dirty="0"/>
+              <a:t>&gt; </a:t>
+            </a:r>
+            <a:r>
+              <a:rPr lang="en-US" sz="1000" dirty="0" err="1"/>
+              <a:t>summary.aov</a:t>
+            </a:r>
+            <a:r>
+              <a:rPr lang="en-US" sz="1000" dirty="0"/>
+              <a:t>(fieldres.man1)</a:t>
+            </a:r>
+          </a:p>
+          <a:p>
+            <a:r>
+              <a:rPr lang="en-US" sz="1000" dirty="0"/>
+              <a:t> Response Length.mm :</a:t>
+            </a:r>
+          </a:p>
+          <a:p>
+            <a:r>
+              <a:rPr lang="en-US" sz="1000" dirty="0"/>
+              <a:t>             </a:t>
+            </a:r>
+            <a:r>
+              <a:rPr lang="en-US" sz="1000" dirty="0" err="1"/>
+              <a:t>Df</a:t>
+            </a:r>
+            <a:r>
+              <a:rPr lang="en-US" sz="1000" dirty="0"/>
+              <a:t> Sum </a:t>
+            </a:r>
+            <a:r>
+              <a:rPr lang="en-US" sz="1000" dirty="0" err="1"/>
+              <a:t>Sq</a:t>
+            </a:r>
+            <a:r>
+              <a:rPr lang="en-US" sz="1000" dirty="0"/>
+              <a:t> Mean </a:t>
+            </a:r>
+            <a:r>
+              <a:rPr lang="en-US" sz="1000" dirty="0" err="1"/>
+              <a:t>Sq</a:t>
+            </a:r>
+            <a:r>
+              <a:rPr lang="en-US" sz="1000" dirty="0"/>
+              <a:t> F value    </a:t>
+            </a:r>
+            <a:r>
+              <a:rPr lang="en-US" sz="1000" dirty="0" err="1"/>
+              <a:t>Pr</a:t>
+            </a:r>
+            <a:r>
+              <a:rPr lang="en-US" sz="1000" dirty="0"/>
+              <a:t>(&gt;F)    </a:t>
+            </a:r>
+          </a:p>
+          <a:p>
+            <a:r>
+              <a:rPr lang="en-US" sz="1000" dirty="0"/>
+              <a:t>Biome         2 3.1139 1.55697  52.848 &lt; 2.2e-16 ***</a:t>
+            </a:r>
+          </a:p>
+          <a:p>
+            <a:r>
+              <a:rPr lang="en-US" sz="1000" dirty="0"/>
+              <a:t>Residuals   237 6.9823 0.02946                      </a:t>
+            </a:r>
+          </a:p>
+          <a:p>
+            <a:r>
+              <a:rPr lang="en-US" sz="1000" dirty="0"/>
+              <a:t>---</a:t>
+            </a:r>
+          </a:p>
+          <a:p>
+            <a:r>
+              <a:rPr lang="en-US" sz="1000" dirty="0" err="1"/>
+              <a:t>Signif</a:t>
+            </a:r>
+            <a:r>
+              <a:rPr lang="en-US" sz="1000" dirty="0"/>
+              <a:t>. codes:  0 ‘***’ 0.001 ‘**’ 0.01 ‘*’ 0.05 ‘.’ 0.1 ‘ ’ 1</a:t>
+            </a:r>
+          </a:p>
+          <a:p>
+            <a:endParaRPr lang="en-US" sz="1000" dirty="0"/>
+          </a:p>
+          <a:p>
+            <a:r>
+              <a:rPr lang="en-US" sz="1000" dirty="0"/>
+              <a:t> Response CS :</a:t>
+            </a:r>
+          </a:p>
+          <a:p>
+            <a:r>
+              <a:rPr lang="en-US" sz="1000" dirty="0"/>
+              <a:t>             </a:t>
+            </a:r>
+            <a:r>
+              <a:rPr lang="en-US" sz="1000" dirty="0" err="1"/>
+              <a:t>Df</a:t>
+            </a:r>
+            <a:r>
+              <a:rPr lang="en-US" sz="1000" dirty="0"/>
+              <a:t> Sum </a:t>
+            </a:r>
+            <a:r>
+              <a:rPr lang="en-US" sz="1000" dirty="0" err="1"/>
+              <a:t>Sq</a:t>
+            </a:r>
+            <a:r>
+              <a:rPr lang="en-US" sz="1000" dirty="0"/>
+              <a:t> Mean </a:t>
+            </a:r>
+            <a:r>
+              <a:rPr lang="en-US" sz="1000" dirty="0" err="1"/>
+              <a:t>Sq</a:t>
+            </a:r>
+            <a:r>
+              <a:rPr lang="en-US" sz="1000" dirty="0"/>
+              <a:t> F value    </a:t>
+            </a:r>
+            <a:r>
+              <a:rPr lang="en-US" sz="1000" dirty="0" err="1"/>
+              <a:t>Pr</a:t>
+            </a:r>
+            <a:r>
+              <a:rPr lang="en-US" sz="1000" dirty="0"/>
+              <a:t>(&gt;F)    </a:t>
+            </a:r>
+          </a:p>
+          <a:p>
+            <a:r>
+              <a:rPr lang="en-US" sz="1000" dirty="0"/>
+              <a:t>Biome         2 2.8312  1.4156  54.028 &lt; 2.2e-16 ***</a:t>
+            </a:r>
+          </a:p>
+          <a:p>
+            <a:r>
+              <a:rPr lang="en-US" sz="1000" dirty="0"/>
+              <a:t>Residuals   237 6.2096  0.0262                      </a:t>
+            </a:r>
+          </a:p>
+          <a:p>
+            <a:r>
+              <a:rPr lang="en-US" sz="1000" dirty="0"/>
+              <a:t>---</a:t>
+            </a:r>
+          </a:p>
+          <a:p>
+            <a:r>
+              <a:rPr lang="en-US" sz="1000" dirty="0" err="1"/>
+              <a:t>Signif</a:t>
+            </a:r>
+            <a:r>
+              <a:rPr lang="en-US" sz="1000" dirty="0"/>
+              <a:t>. codes:  0 ‘***’ 0.001 ‘**’ 0.01 ‘*’ 0.05 ‘.’ 0.1 ‘ ’ 1</a:t>
+            </a:r>
+          </a:p>
+        </p:txBody>
+      </p:sp>
+    </p:spTree>
+    <p:extLst>
+      <p:ext uri="{BB962C8B-B14F-4D97-AF65-F5344CB8AC3E}">
+        <p14:creationId xmlns:p14="http://schemas.microsoft.com/office/powerpoint/2010/main" val="2120125065"/>
       </p:ext>
     </p:extLst>
   </p:cSld>

</xml_diff>